<commit_message>
Complete views. Separated source and headers.
</commit_message>
<xml_diff>
--- a/AttendanceList.Modeling/UI/Main.pptx
+++ b/AttendanceList.Modeling/UI/Main.pptx
@@ -293,7 +293,7 @@
             <a:fld id="{3D310357-4D2C-4857-8659-81BCAA7C56A1}" type="datetimeFigureOut">
               <a:rPr lang="en-US" smtClean="0"/>
               <a:pPr/>
-              <a:t>4/2/2015</a:t>
+              <a:t>4/3/2015</a:t>
             </a:fld>
             <a:endParaRPr lang="en-US"/>
           </a:p>
@@ -460,7 +460,7 @@
             <a:fld id="{3D310357-4D2C-4857-8659-81BCAA7C56A1}" type="datetimeFigureOut">
               <a:rPr lang="en-US" smtClean="0"/>
               <a:pPr/>
-              <a:t>4/2/2015</a:t>
+              <a:t>4/3/2015</a:t>
             </a:fld>
             <a:endParaRPr lang="en-US"/>
           </a:p>
@@ -637,7 +637,7 @@
             <a:fld id="{3D310357-4D2C-4857-8659-81BCAA7C56A1}" type="datetimeFigureOut">
               <a:rPr lang="en-US" smtClean="0"/>
               <a:pPr/>
-              <a:t>4/2/2015</a:t>
+              <a:t>4/3/2015</a:t>
             </a:fld>
             <a:endParaRPr lang="en-US"/>
           </a:p>
@@ -795,7 +795,7 @@
             <a:fld id="{3D310357-4D2C-4857-8659-81BCAA7C56A1}" type="datetimeFigureOut">
               <a:rPr lang="en-US" smtClean="0"/>
               <a:pPr/>
-              <a:t>4/2/2015</a:t>
+              <a:t>4/3/2015</a:t>
             </a:fld>
             <a:endParaRPr lang="en-US"/>
           </a:p>
@@ -1038,7 +1038,7 @@
             <a:fld id="{3D310357-4D2C-4857-8659-81BCAA7C56A1}" type="datetimeFigureOut">
               <a:rPr lang="en-US" smtClean="0"/>
               <a:pPr/>
-              <a:t>4/2/2015</a:t>
+              <a:t>4/3/2015</a:t>
             </a:fld>
             <a:endParaRPr lang="en-US"/>
           </a:p>
@@ -1323,7 +1323,7 @@
             <a:fld id="{3D310357-4D2C-4857-8659-81BCAA7C56A1}" type="datetimeFigureOut">
               <a:rPr lang="en-US" smtClean="0"/>
               <a:pPr/>
-              <a:t>4/2/2015</a:t>
+              <a:t>4/3/2015</a:t>
             </a:fld>
             <a:endParaRPr lang="en-US"/>
           </a:p>
@@ -1742,7 +1742,7 @@
             <a:fld id="{3D310357-4D2C-4857-8659-81BCAA7C56A1}" type="datetimeFigureOut">
               <a:rPr lang="en-US" smtClean="0"/>
               <a:pPr/>
-              <a:t>4/2/2015</a:t>
+              <a:t>4/3/2015</a:t>
             </a:fld>
             <a:endParaRPr lang="en-US"/>
           </a:p>
@@ -1857,7 +1857,7 @@
             <a:fld id="{3D310357-4D2C-4857-8659-81BCAA7C56A1}" type="datetimeFigureOut">
               <a:rPr lang="en-US" smtClean="0"/>
               <a:pPr/>
-              <a:t>4/2/2015</a:t>
+              <a:t>4/3/2015</a:t>
             </a:fld>
             <a:endParaRPr lang="en-US"/>
           </a:p>
@@ -1949,7 +1949,7 @@
             <a:fld id="{3D310357-4D2C-4857-8659-81BCAA7C56A1}" type="datetimeFigureOut">
               <a:rPr lang="en-US" smtClean="0"/>
               <a:pPr/>
-              <a:t>4/2/2015</a:t>
+              <a:t>4/3/2015</a:t>
             </a:fld>
             <a:endParaRPr lang="en-US"/>
           </a:p>
@@ -2223,7 +2223,7 @@
             <a:fld id="{3D310357-4D2C-4857-8659-81BCAA7C56A1}" type="datetimeFigureOut">
               <a:rPr lang="en-US" smtClean="0"/>
               <a:pPr/>
-              <a:t>4/2/2015</a:t>
+              <a:t>4/3/2015</a:t>
             </a:fld>
             <a:endParaRPr lang="en-US"/>
           </a:p>
@@ -2473,7 +2473,7 @@
             <a:fld id="{3D310357-4D2C-4857-8659-81BCAA7C56A1}" type="datetimeFigureOut">
               <a:rPr lang="en-US" smtClean="0"/>
               <a:pPr/>
-              <a:t>4/2/2015</a:t>
+              <a:t>4/3/2015</a:t>
             </a:fld>
             <a:endParaRPr lang="en-US"/>
           </a:p>
@@ -2683,7 +2683,7 @@
             <a:fld id="{3D310357-4D2C-4857-8659-81BCAA7C56A1}" type="datetimeFigureOut">
               <a:rPr lang="en-US" smtClean="0"/>
               <a:pPr/>
-              <a:t>4/2/2015</a:t>
+              <a:t>4/3/2015</a:t>
             </a:fld>
             <a:endParaRPr lang="en-US"/>
           </a:p>
@@ -9429,17 +9429,65 @@
                   <a:schemeClr val="bg1"/>
                 </a:solidFill>
               </a:rPr>
-              <a:t>Enter ‘check’ to check students attendance this week.</a:t>
-            </a:r>
-          </a:p>
-          <a:p>
+              <a:t>Press </a:t>
+            </a:r>
             <a:r>
               <a:rPr lang="en-US" dirty="0" smtClean="0">
                 <a:solidFill>
                   <a:schemeClr val="bg1"/>
                 </a:solidFill>
               </a:rPr>
-              <a:t>Enter ‘quit’ to exit.</a:t>
+              <a:t>‘</a:t>
+            </a:r>
+            <a:r>
+              <a:rPr lang="en-US" dirty="0" smtClean="0">
+                <a:solidFill>
+                  <a:schemeClr val="bg1"/>
+                </a:solidFill>
+              </a:rPr>
+              <a:t>c’ </a:t>
+            </a:r>
+            <a:r>
+              <a:rPr lang="en-US" dirty="0" smtClean="0">
+                <a:solidFill>
+                  <a:schemeClr val="bg1"/>
+                </a:solidFill>
+              </a:rPr>
+              <a:t>to check students attendance this week.</a:t>
+            </a:r>
+          </a:p>
+          <a:p>
+            <a:r>
+              <a:rPr lang="en-US" dirty="0" smtClean="0">
+                <a:solidFill>
+                  <a:schemeClr val="bg1"/>
+                </a:solidFill>
+              </a:rPr>
+              <a:t>Press </a:t>
+            </a:r>
+            <a:r>
+              <a:rPr lang="en-US" dirty="0" smtClean="0">
+                <a:solidFill>
+                  <a:schemeClr val="bg1"/>
+                </a:solidFill>
+              </a:rPr>
+              <a:t>‘</a:t>
+            </a:r>
+            <a:r>
+              <a:rPr lang="en-US" dirty="0" smtClean="0">
+                <a:solidFill>
+                  <a:schemeClr val="bg1"/>
+                </a:solidFill>
+              </a:rPr>
+              <a:t>q’ </a:t>
+            </a:r>
+            <a:r>
+              <a:rPr lang="en-US" dirty="0" smtClean="0">
+                <a:solidFill>
+                  <a:schemeClr val="bg1"/>
+                </a:solidFill>
+              </a:rPr>
+              <a:t>to exit.</a:t>
             </a:r>
           </a:p>
           <a:p>
@@ -9576,11 +9624,7 @@
           <a:p>
             <a:r>
               <a:rPr lang="en-US" dirty="0" smtClean="0"/>
-              <a:t>OK, we finished checking attendance of this week</a:t>
-            </a:r>
-            <a:r>
-              <a:rPr lang="en-US" dirty="0" smtClean="0"/>
-              <a:t>.</a:t>
+              <a:t>OK, we finished checking attendance of this week.</a:t>
             </a:r>
           </a:p>
           <a:p>

</xml_diff>

<commit_message>
Add week number in list. Added List to UML class diagram.
</commit_message>
<xml_diff>
--- a/AttendanceList.Modeling/UI/Main.pptx
+++ b/AttendanceList.Modeling/UI/Main.pptx
@@ -293,7 +293,7 @@
             <a:fld id="{3D310357-4D2C-4857-8659-81BCAA7C56A1}" type="datetimeFigureOut">
               <a:rPr lang="en-US" smtClean="0"/>
               <a:pPr/>
-              <a:t>4/3/2015</a:t>
+              <a:t>4/4/2015</a:t>
             </a:fld>
             <a:endParaRPr lang="en-US"/>
           </a:p>
@@ -460,7 +460,7 @@
             <a:fld id="{3D310357-4D2C-4857-8659-81BCAA7C56A1}" type="datetimeFigureOut">
               <a:rPr lang="en-US" smtClean="0"/>
               <a:pPr/>
-              <a:t>4/3/2015</a:t>
+              <a:t>4/4/2015</a:t>
             </a:fld>
             <a:endParaRPr lang="en-US"/>
           </a:p>
@@ -637,7 +637,7 @@
             <a:fld id="{3D310357-4D2C-4857-8659-81BCAA7C56A1}" type="datetimeFigureOut">
               <a:rPr lang="en-US" smtClean="0"/>
               <a:pPr/>
-              <a:t>4/3/2015</a:t>
+              <a:t>4/4/2015</a:t>
             </a:fld>
             <a:endParaRPr lang="en-US"/>
           </a:p>
@@ -795,7 +795,7 @@
             <a:fld id="{3D310357-4D2C-4857-8659-81BCAA7C56A1}" type="datetimeFigureOut">
               <a:rPr lang="en-US" smtClean="0"/>
               <a:pPr/>
-              <a:t>4/3/2015</a:t>
+              <a:t>4/4/2015</a:t>
             </a:fld>
             <a:endParaRPr lang="en-US"/>
           </a:p>
@@ -1038,7 +1038,7 @@
             <a:fld id="{3D310357-4D2C-4857-8659-81BCAA7C56A1}" type="datetimeFigureOut">
               <a:rPr lang="en-US" smtClean="0"/>
               <a:pPr/>
-              <a:t>4/3/2015</a:t>
+              <a:t>4/4/2015</a:t>
             </a:fld>
             <a:endParaRPr lang="en-US"/>
           </a:p>
@@ -1323,7 +1323,7 @@
             <a:fld id="{3D310357-4D2C-4857-8659-81BCAA7C56A1}" type="datetimeFigureOut">
               <a:rPr lang="en-US" smtClean="0"/>
               <a:pPr/>
-              <a:t>4/3/2015</a:t>
+              <a:t>4/4/2015</a:t>
             </a:fld>
             <a:endParaRPr lang="en-US"/>
           </a:p>
@@ -1742,7 +1742,7 @@
             <a:fld id="{3D310357-4D2C-4857-8659-81BCAA7C56A1}" type="datetimeFigureOut">
               <a:rPr lang="en-US" smtClean="0"/>
               <a:pPr/>
-              <a:t>4/3/2015</a:t>
+              <a:t>4/4/2015</a:t>
             </a:fld>
             <a:endParaRPr lang="en-US"/>
           </a:p>
@@ -1857,7 +1857,7 @@
             <a:fld id="{3D310357-4D2C-4857-8659-81BCAA7C56A1}" type="datetimeFigureOut">
               <a:rPr lang="en-US" smtClean="0"/>
               <a:pPr/>
-              <a:t>4/3/2015</a:t>
+              <a:t>4/4/2015</a:t>
             </a:fld>
             <a:endParaRPr lang="en-US"/>
           </a:p>
@@ -1949,7 +1949,7 @@
             <a:fld id="{3D310357-4D2C-4857-8659-81BCAA7C56A1}" type="datetimeFigureOut">
               <a:rPr lang="en-US" smtClean="0"/>
               <a:pPr/>
-              <a:t>4/3/2015</a:t>
+              <a:t>4/4/2015</a:t>
             </a:fld>
             <a:endParaRPr lang="en-US"/>
           </a:p>
@@ -2223,7 +2223,7 @@
             <a:fld id="{3D310357-4D2C-4857-8659-81BCAA7C56A1}" type="datetimeFigureOut">
               <a:rPr lang="en-US" smtClean="0"/>
               <a:pPr/>
-              <a:t>4/3/2015</a:t>
+              <a:t>4/4/2015</a:t>
             </a:fld>
             <a:endParaRPr lang="en-US"/>
           </a:p>
@@ -2473,7 +2473,7 @@
             <a:fld id="{3D310357-4D2C-4857-8659-81BCAA7C56A1}" type="datetimeFigureOut">
               <a:rPr lang="en-US" smtClean="0"/>
               <a:pPr/>
-              <a:t>4/3/2015</a:t>
+              <a:t>4/4/2015</a:t>
             </a:fld>
             <a:endParaRPr lang="en-US"/>
           </a:p>
@@ -2683,7 +2683,7 @@
             <a:fld id="{3D310357-4D2C-4857-8659-81BCAA7C56A1}" type="datetimeFigureOut">
               <a:rPr lang="en-US" smtClean="0"/>
               <a:pPr/>
-              <a:t>4/3/2015</a:t>
+              <a:t>4/4/2015</a:t>
             </a:fld>
             <a:endParaRPr lang="en-US"/>
           </a:p>
@@ -9429,7 +9429,31 @@
                   <a:schemeClr val="bg1"/>
                 </a:solidFill>
               </a:rPr>
-              <a:t>Press </a:t>
+              <a:t>Press ‘c’ to check students </a:t>
+            </a:r>
+            <a:r>
+              <a:rPr lang="en-US" smtClean="0">
+                <a:solidFill>
+                  <a:schemeClr val="bg1"/>
+                </a:solidFill>
+              </a:rPr>
+              <a:t>attendance </a:t>
+            </a:r>
+            <a:r>
+              <a:rPr lang="en-US" smtClean="0">
+                <a:solidFill>
+                  <a:schemeClr val="bg1"/>
+                </a:solidFill>
+              </a:rPr>
+              <a:t>of #2</a:t>
+            </a:r>
+            <a:r>
+              <a:rPr lang="en-US" smtClean="0">
+                <a:solidFill>
+                  <a:schemeClr val="bg1"/>
+                </a:solidFill>
+              </a:rPr>
+              <a:t> </a:t>
             </a:r>
             <a:r>
               <a:rPr lang="en-US" dirty="0" smtClean="0">
@@ -9437,57 +9461,17 @@
                   <a:schemeClr val="bg1"/>
                 </a:solidFill>
               </a:rPr>
-              <a:t>‘</a:t>
-            </a:r>
+              <a:t>week.</a:t>
+            </a:r>
+          </a:p>
+          <a:p>
             <a:r>
               <a:rPr lang="en-US" dirty="0" smtClean="0">
                 <a:solidFill>
                   <a:schemeClr val="bg1"/>
                 </a:solidFill>
               </a:rPr>
-              <a:t>c’ </a:t>
-            </a:r>
-            <a:r>
-              <a:rPr lang="en-US" dirty="0" smtClean="0">
-                <a:solidFill>
-                  <a:schemeClr val="bg1"/>
-                </a:solidFill>
-              </a:rPr>
-              <a:t>to check students attendance this week.</a:t>
-            </a:r>
-          </a:p>
-          <a:p>
-            <a:r>
-              <a:rPr lang="en-US" dirty="0" smtClean="0">
-                <a:solidFill>
-                  <a:schemeClr val="bg1"/>
-                </a:solidFill>
-              </a:rPr>
-              <a:t>Press </a:t>
-            </a:r>
-            <a:r>
-              <a:rPr lang="en-US" dirty="0" smtClean="0">
-                <a:solidFill>
-                  <a:schemeClr val="bg1"/>
-                </a:solidFill>
-              </a:rPr>
-              <a:t>‘</a:t>
-            </a:r>
-            <a:r>
-              <a:rPr lang="en-US" dirty="0" smtClean="0">
-                <a:solidFill>
-                  <a:schemeClr val="bg1"/>
-                </a:solidFill>
-              </a:rPr>
-              <a:t>q’ </a:t>
-            </a:r>
-            <a:r>
-              <a:rPr lang="en-US" dirty="0" smtClean="0">
-                <a:solidFill>
-                  <a:schemeClr val="bg1"/>
-                </a:solidFill>
-              </a:rPr>
-              <a:t>to exit.</a:t>
+              <a:t>Press ‘q’ to exit.</a:t>
             </a:r>
           </a:p>
           <a:p>

</xml_diff>

<commit_message>
Add Erfan changes to UI.
</commit_message>
<xml_diff>
--- a/AttendanceList.Modeling/UI/Main.pptx
+++ b/AttendanceList.Modeling/UI/Main.pptx
@@ -3269,25 +3269,58 @@
         <p:spPr/>
         <p:txBody>
           <a:bodyPr>
-            <a:normAutofit fontScale="85000" lnSpcReduction="20000"/>
+            <a:normAutofit fontScale="77500" lnSpcReduction="20000"/>
           </a:bodyPr>
           <a:lstStyle/>
           <a:p>
             <a:r>
               <a:rPr lang="en-US" dirty="0" smtClean="0"/>
-              <a:t>Provide an empty student next to your last student to complete this process.</a:t>
-            </a:r>
-          </a:p>
-          <a:p>
+              <a:t>Hey, </a:t>
+            </a:r>
             <a:r>
               <a:rPr lang="en-US" dirty="0" smtClean="0"/>
-              <a:t>Don’t worry about their order. I will order them when you were done.</a:t>
-            </a:r>
-          </a:p>
-          <a:p>
+              <a:t>If you </a:t>
+            </a:r>
             <a:r>
               <a:rPr lang="en-US" dirty="0" smtClean="0"/>
-              <a:t>Be careful in entering inputs. I don’t know about their format, so I don’t do validation.</a:t>
+              <a:t>want to add students you can in the field below.</a:t>
+            </a:r>
+          </a:p>
+          <a:p>
+            <a:r>
+              <a:rPr lang="en-US" dirty="0" smtClean="0"/>
+              <a:t>And if you want to finish adding student you can easily just not typing anything and enter.</a:t>
+            </a:r>
+          </a:p>
+          <a:p>
+            <a:r>
+              <a:rPr lang="en-US" dirty="0" smtClean="0"/>
+              <a:t>Don’t  worry about their name’s order. I’ll order them as soon as </a:t>
+            </a:r>
+            <a:r>
+              <a:rPr lang="en-US" dirty="0" smtClean="0"/>
+              <a:t>possible! I mean next release </a:t>
+            </a:r>
+            <a:r>
+              <a:rPr lang="en-US" dirty="0" smtClean="0">
+                <a:sym typeface="Wingdings" pitchFamily="2" charset="2"/>
+              </a:rPr>
+              <a:t>:-)</a:t>
+            </a:r>
+            <a:endParaRPr lang="en-US" dirty="0" smtClean="0"/>
+          </a:p>
+          <a:p>
+            <a:r>
+              <a:rPr lang="en-US" dirty="0" smtClean="0"/>
+              <a:t>I can’t  check whether their names are valid or not so be </a:t>
+            </a:r>
+            <a:r>
+              <a:rPr lang="en-US" dirty="0" smtClean="0"/>
+              <a:t>CAREFUL in filling Inputs</a:t>
+            </a:r>
+            <a:r>
+              <a:rPr lang="en-US" dirty="0" smtClean="0"/>
+              <a:t>;</a:t>
             </a:r>
           </a:p>
           <a:p>
@@ -3362,13 +3395,13 @@
           <a:p>
             <a:r>
               <a:rPr lang="en-US" dirty="0" smtClean="0"/>
-              <a:t>OK, I have added 2 students to your list.</a:t>
+              <a:t>OK, I added 2 student(s) to your list</a:t>
             </a:r>
           </a:p>
           <a:p>
             <a:r>
               <a:rPr lang="en-US" dirty="0" smtClean="0"/>
-              <a:t>Now lets check their attendance.</a:t>
+              <a:t>Now lets check if they’re absent or not.</a:t>
             </a:r>
           </a:p>
           <a:p>
@@ -3445,7 +3478,7 @@
         </p:nvGraphicFramePr>
         <p:xfrm>
           <a:off x="152400" y="1676400"/>
-          <a:ext cx="8698910" cy="4038600"/>
+          <a:ext cx="8698910" cy="4111054"/>
         </p:xfrm>
         <a:graphic>
           <a:graphicData uri="http://schemas.openxmlformats.org/drawingml/2006/table">
@@ -3490,16 +3523,35 @@
                         </a:spcAft>
                       </a:pPr>
                       <a:r>
-                        <a:rPr lang="en-US" sz="1400" dirty="0">
+                        <a:rPr lang="en-US" sz="1400" dirty="0" smtClean="0">
                           <a:solidFill>
                             <a:schemeClr val="bg1"/>
                           </a:solidFill>
-                          <a:latin typeface="Calibri"/>
+                          <a:latin typeface="+mn-lt"/>
                           <a:ea typeface="Calibri"/>
                           <a:cs typeface="Arial"/>
                         </a:rPr>
-                        <a:t>Name &amp; Family</a:t>
+                        <a:t>First</a:t>
                       </a:r>
+                      <a:r>
+                        <a:rPr lang="en-US" sz="1400" baseline="0" dirty="0" smtClean="0">
+                          <a:solidFill>
+                            <a:schemeClr val="bg1"/>
+                          </a:solidFill>
+                          <a:latin typeface="+mn-lt"/>
+                          <a:ea typeface="Calibri"/>
+                          <a:cs typeface="Arial"/>
+                        </a:rPr>
+                        <a:t> and Last Name</a:t>
+                      </a:r>
+                      <a:endParaRPr lang="en-US" sz="1400" dirty="0">
+                        <a:solidFill>
+                          <a:schemeClr val="bg1"/>
+                        </a:solidFill>
+                        <a:latin typeface="+mn-lt"/>
+                        <a:ea typeface="Calibri"/>
+                        <a:cs typeface="Arial"/>
+                      </a:endParaRPr>
                     </a:p>
                   </a:txBody>
                   <a:tcPr marL="55619" marR="55619" marT="0" marB="0" anchor="ctr">
@@ -9429,60 +9481,33 @@
                   <a:schemeClr val="bg1"/>
                 </a:solidFill>
               </a:rPr>
-              <a:t>Press ‘c’ to check students </a:t>
-            </a:r>
-            <a:r>
-              <a:rPr lang="en-US" smtClean="0">
-                <a:solidFill>
-                  <a:schemeClr val="bg1"/>
-                </a:solidFill>
-              </a:rPr>
-              <a:t>attendance </a:t>
-            </a:r>
-            <a:r>
-              <a:rPr lang="en-US" smtClean="0">
-                <a:solidFill>
-                  <a:schemeClr val="bg1"/>
-                </a:solidFill>
-              </a:rPr>
-              <a:t>of #2</a:t>
-            </a:r>
-            <a:r>
-              <a:rPr lang="en-US" smtClean="0">
-                <a:solidFill>
-                  <a:schemeClr val="bg1"/>
-                </a:solidFill>
-              </a:rPr>
-              <a:t> </a:t>
-            </a:r>
+              <a:t>-To Check students attendance of #2 week just press ‘c’.</a:t>
+            </a:r>
+          </a:p>
+          <a:p>
             <a:r>
               <a:rPr lang="en-US" dirty="0" smtClean="0">
                 <a:solidFill>
                   <a:schemeClr val="bg1"/>
                 </a:solidFill>
               </a:rPr>
-              <a:t>week.</a:t>
-            </a:r>
-          </a:p>
-          <a:p>
+              <a:t>-To quit press ‘q</a:t>
+            </a:r>
             <a:r>
               <a:rPr lang="en-US" dirty="0" smtClean="0">
                 <a:solidFill>
                   <a:schemeClr val="bg1"/>
                 </a:solidFill>
               </a:rPr>
-              <a:t>Press ‘q’ to exit.</a:t>
-            </a:r>
-          </a:p>
-          <a:p>
-            <a:r>
-              <a:rPr lang="en-US" dirty="0" smtClean="0">
-                <a:solidFill>
-                  <a:schemeClr val="bg1"/>
-                </a:solidFill>
-              </a:rPr>
-              <a:t>&gt;</a:t>
-            </a:r>
+              <a:t>’</a:t>
+            </a:r>
+          </a:p>
+          <a:p>
+            <a:endParaRPr lang="en-US" dirty="0" smtClean="0">
+              <a:solidFill>
+                <a:schemeClr val="bg1"/>
+              </a:solidFill>
+            </a:endParaRPr>
           </a:p>
         </p:txBody>
       </p:sp>
@@ -9564,7 +9589,31 @@
           <a:p>
             <a:r>
               <a:rPr lang="en-US" dirty="0" smtClean="0"/>
-              <a:t>Press Enter to skip student, or Press X to mark student as absent.</a:t>
+              <a:t>Press X after absent </a:t>
+            </a:r>
+            <a:r>
+              <a:rPr lang="en-US" dirty="0" smtClean="0"/>
+              <a:t>students </a:t>
+            </a:r>
+            <a:r>
+              <a:rPr lang="en-US" dirty="0" smtClean="0"/>
+              <a:t>And </a:t>
+            </a:r>
+            <a:r>
+              <a:rPr lang="en-US" dirty="0" smtClean="0"/>
+              <a:t>just press Enter </a:t>
+            </a:r>
+            <a:r>
+              <a:rPr lang="en-US" dirty="0" smtClean="0"/>
+              <a:t>If </a:t>
+            </a:r>
+            <a:r>
+              <a:rPr lang="en-US" dirty="0" smtClean="0"/>
+              <a:t>he/she is present</a:t>
+            </a:r>
+            <a:r>
+              <a:rPr lang="en-US" dirty="0" smtClean="0"/>
+              <a:t>.</a:t>
             </a:r>
           </a:p>
           <a:p>
@@ -9608,24 +9657,19 @@
           <a:p>
             <a:r>
               <a:rPr lang="en-US" dirty="0" smtClean="0"/>
-              <a:t>OK, we finished checking attendance of this week.</a:t>
+              <a:t>Okay , That’s all.</a:t>
             </a:r>
           </a:p>
           <a:p>
             <a:r>
               <a:rPr lang="en-US" dirty="0" smtClean="0"/>
-              <a:t>We have 1 </a:t>
-            </a:r>
+              <a:t>We have 1 absent student(s).</a:t>
+            </a:r>
+          </a:p>
+          <a:p>
             <a:r>
               <a:rPr lang="en-US" smtClean="0"/>
-              <a:t>absent students.</a:t>
-            </a:r>
-            <a:endParaRPr lang="en-US" dirty="0" smtClean="0"/>
-          </a:p>
-          <a:p>
-            <a:r>
-              <a:rPr lang="en-US" dirty="0" smtClean="0"/>
-              <a:t>Press Enter to go back to Student list…</a:t>
+              <a:t>To go back to student’s list press ‘Enter’ …</a:t>
             </a:r>
             <a:endParaRPr lang="en-US" dirty="0"/>
           </a:p>

</xml_diff>